<commit_message>
M0078DDG-401 update watchdog timer schematics
</commit_message>
<xml_diff>
--- a/PlatformDeveloperGuide/images/watchdog_highlevel_diagram.pptx
+++ b/PlatformDeveloperGuide/images/watchdog_highlevel_diagram.pptx
@@ -4489,7 +4489,7 @@
           <a:p>
             <a:fld id="{67187AE1-87DF-4843-9F94-3D99DBF3BED3}" type="datetimeFigureOut">
               <a:rPr lang="en-US" smtClean="0"/>
-              <a:t>4/22/2021</a:t>
+              <a:t>7/26/2021</a:t>
             </a:fld>
             <a:endParaRPr lang="en-US"/>
           </a:p>
@@ -7755,15 +7755,13 @@
         </p:nvSpPr>
         <p:spPr>
           <a:xfrm rot="16200000">
-            <a:off x="5683466" y="3338405"/>
-            <a:ext cx="1269400" cy="257369"/>
+            <a:off x="5683466" y="3246072"/>
+            <a:ext cx="1269400" cy="442035"/>
           </a:xfrm>
           <a:prstGeom prst="rect">
             <a:avLst/>
           </a:prstGeom>
-          <a:solidFill>
-            <a:schemeClr val="bg1"/>
-          </a:solidFill>
+          <a:noFill/>
         </p:spPr>
         <p:txBody>
           <a:bodyPr wrap="square" tIns="36000" bIns="36000" rtlCol="0">
@@ -7776,7 +7774,7 @@
               <a:rPr lang="en-US" sz="1200" dirty="0">
                 <a:latin typeface="Source Sans Pro Light" charset="0"/>
               </a:rPr>
-              <a:t>Watchdog LLAPI</a:t>
+              <a:t>Watchdog Timer LLAPI</a:t>
             </a:r>
           </a:p>
         </p:txBody>
@@ -7852,10 +7850,10 @@
         </p:nvGrpSpPr>
         <p:grpSpPr>
           <a:xfrm>
-            <a:off x="2239403" y="3083342"/>
-            <a:ext cx="339274" cy="1525995"/>
-            <a:chOff x="2211275" y="3367293"/>
-            <a:chExt cx="339274" cy="1525995"/>
+            <a:off x="2279676" y="3083342"/>
+            <a:ext cx="762750" cy="1525995"/>
+            <a:chOff x="2209949" y="3367293"/>
+            <a:chExt cx="503590" cy="1525995"/>
           </a:xfrm>
         </p:grpSpPr>
         <p:sp>
@@ -7929,8 +7927,8 @@
           </p:nvSpPr>
           <p:spPr>
             <a:xfrm rot="16200000">
-              <a:off x="1746211" y="3986218"/>
-              <a:ext cx="1269400" cy="288147"/>
+              <a:off x="1827044" y="3842834"/>
+              <a:ext cx="1269400" cy="503590"/>
             </a:xfrm>
             <a:prstGeom prst="rect">
               <a:avLst/>
@@ -7951,7 +7949,7 @@
                   </a:solidFill>
                   <a:latin typeface="Source Sans Pro Light" charset="0"/>
                 </a:rPr>
-                <a:t>Watchdog  </a:t>
+                <a:t>Watchdog Timer  </a:t>
               </a:r>
               <a:r>
                 <a:rPr lang="en-US" sz="1400" dirty="0" err="1">
@@ -7986,10 +7984,10 @@
         </p:nvGrpSpPr>
         <p:grpSpPr>
           <a:xfrm>
-            <a:off x="3174923" y="3099783"/>
-            <a:ext cx="339274" cy="1525997"/>
-            <a:chOff x="3134943" y="3344485"/>
-            <a:chExt cx="339274" cy="1525997"/>
+            <a:off x="3217203" y="3014871"/>
+            <a:ext cx="769499" cy="1610907"/>
+            <a:chOff x="3134943" y="3259573"/>
+            <a:chExt cx="508046" cy="1610907"/>
           </a:xfrm>
         </p:grpSpPr>
         <p:sp>
@@ -8063,8 +8061,8 @@
           </p:nvSpPr>
           <p:spPr>
             <a:xfrm rot="16200000">
-              <a:off x="2541581" y="3963410"/>
-              <a:ext cx="1525996" cy="288147"/>
+              <a:off x="2628196" y="3770776"/>
+              <a:ext cx="1525996" cy="503590"/>
             </a:xfrm>
             <a:prstGeom prst="rect">
               <a:avLst/>
@@ -8085,7 +8083,7 @@
                   </a:solidFill>
                   <a:latin typeface="Source Sans Pro Light" charset="0"/>
                 </a:rPr>
-                <a:t>Watchdog  start</a:t>
+                <a:t>Watchdog Timer  start</a:t>
               </a:r>
             </a:p>
           </p:txBody>
@@ -8105,10 +8103,10 @@
         </p:nvGrpSpPr>
         <p:grpSpPr>
           <a:xfrm>
-            <a:off x="4110444" y="3046605"/>
-            <a:ext cx="339274" cy="1599469"/>
-            <a:chOff x="3487664" y="3410872"/>
-            <a:chExt cx="339274" cy="1599469"/>
+            <a:off x="3980477" y="3012888"/>
+            <a:ext cx="631696" cy="1599469"/>
+            <a:chOff x="3469519" y="3377155"/>
+            <a:chExt cx="503590" cy="1599469"/>
           </a:xfrm>
         </p:grpSpPr>
         <p:sp>
@@ -8182,8 +8180,8 @@
           </p:nvSpPr>
           <p:spPr>
             <a:xfrm rot="16200000">
-              <a:off x="2857566" y="4066533"/>
-              <a:ext cx="1599469" cy="288147"/>
+              <a:off x="2921579" y="3925095"/>
+              <a:ext cx="1599469" cy="503590"/>
             </a:xfrm>
             <a:prstGeom prst="rect">
               <a:avLst/>
@@ -8204,7 +8202,7 @@
                   </a:solidFill>
                   <a:latin typeface="Source Sans Pro Light" charset="0"/>
                 </a:rPr>
-                <a:t>Watchdog  stop</a:t>
+                <a:t>Watchdog Timer  stop</a:t>
               </a:r>
             </a:p>
           </p:txBody>
@@ -8224,8 +8222,8 @@
         </p:nvSpPr>
         <p:spPr>
           <a:xfrm>
-            <a:off x="4677548" y="3894876"/>
-            <a:ext cx="1197204" cy="507831"/>
+            <a:off x="4763280" y="3868235"/>
+            <a:ext cx="1197204" cy="430887"/>
           </a:xfrm>
           <a:prstGeom prst="rect">
             <a:avLst/>
@@ -8268,24 +8266,39 @@
               </a:rPr>
               <a:t>Watchdog</a:t>
             </a:r>
-            <a:endParaRPr lang="fr-FR" sz="1400" dirty="0">
-              <a:solidFill>
-                <a:schemeClr val="bg1"/>
-              </a:solidFill>
-              <a:latin typeface="Source Sans Pro Light" charset="0"/>
-              <a:ea typeface="Source Sans Pro Light" charset="0"/>
-              <a:cs typeface="Source Sans Pro Light" charset="0"/>
-            </a:endParaRPr>
-          </a:p>
-          <a:p>
-            <a:pPr algn="ctr">
-              <a:spcBef>
-                <a:spcPts val="0"/>
-              </a:spcBef>
-              <a:spcAft>
-                <a:spcPts val="600"/>
-              </a:spcAft>
-            </a:pPr>
+            <a:r>
+              <a:rPr lang="fr-FR" sz="1400" dirty="0">
+                <a:solidFill>
+                  <a:schemeClr val="bg1"/>
+                </a:solidFill>
+                <a:latin typeface="Source Sans Pro Light" charset="0"/>
+                <a:ea typeface="Source Sans Pro Light" charset="0"/>
+                <a:cs typeface="Source Sans Pro Light" charset="0"/>
+              </a:rPr>
+              <a:t> </a:t>
+            </a:r>
+            <a:r>
+              <a:rPr lang="fr-FR" sz="1400" dirty="0" err="1">
+                <a:solidFill>
+                  <a:schemeClr val="bg1"/>
+                </a:solidFill>
+                <a:latin typeface="Source Sans Pro Light" charset="0"/>
+                <a:ea typeface="Source Sans Pro Light" charset="0"/>
+                <a:cs typeface="Source Sans Pro Light" charset="0"/>
+              </a:rPr>
+              <a:t>Timer</a:t>
+            </a:r>
+            <a:r>
+              <a:rPr lang="fr-FR" sz="1400" dirty="0">
+                <a:solidFill>
+                  <a:schemeClr val="bg1"/>
+                </a:solidFill>
+                <a:latin typeface="Source Sans Pro Light" charset="0"/>
+                <a:ea typeface="Source Sans Pro Light" charset="0"/>
+                <a:cs typeface="Source Sans Pro Light" charset="0"/>
+              </a:rPr>
+              <a:t> </a:t>
+            </a:r>
             <a:r>
               <a:rPr lang="fr-FR" sz="1400" b="0" i="0" spc="0" dirty="0" err="1">
                 <a:ln>
@@ -8382,7 +8395,7 @@
                 <a:ea typeface="Source Sans Pro" charset="0"/>
                 <a:cs typeface="Source Sans Pro" charset="0"/>
               </a:rPr>
-              <a:t>Watchdog </a:t>
+              <a:t>Watchdog Timer </a:t>
             </a:r>
           </a:p>
           <a:p>
@@ -9301,8 +9314,8 @@
         </p:nvSpPr>
         <p:spPr>
           <a:xfrm>
-            <a:off x="2573446" y="6428538"/>
-            <a:ext cx="2208938" cy="215444"/>
+            <a:off x="2573445" y="6428538"/>
+            <a:ext cx="2841933" cy="215444"/>
           </a:xfrm>
           <a:prstGeom prst="rect">
             <a:avLst/>
@@ -9366,6 +9379,28 @@
                 <a:cs typeface="Source Sans Pro Light" charset="0"/>
               </a:rPr>
               <a:t>Watchdog</a:t>
+            </a:r>
+            <a:r>
+              <a:rPr lang="fr-FR" sz="1400" b="1" i="0" spc="0" dirty="0">
+                <a:ln>
+                  <a:noFill/>
+                </a:ln>
+                <a:latin typeface="Source Sans Pro Light" charset="0"/>
+                <a:ea typeface="Source Sans Pro Light" charset="0"/>
+                <a:cs typeface="Source Sans Pro Light" charset="0"/>
+              </a:rPr>
+              <a:t> </a:t>
+            </a:r>
+            <a:r>
+              <a:rPr lang="fr-FR" sz="1400" b="1" i="0" spc="0" dirty="0" err="1">
+                <a:ln>
+                  <a:noFill/>
+                </a:ln>
+                <a:latin typeface="Source Sans Pro Light" charset="0"/>
+                <a:ea typeface="Source Sans Pro Light" charset="0"/>
+                <a:cs typeface="Source Sans Pro Light" charset="0"/>
+              </a:rPr>
+              <a:t>Timer</a:t>
             </a:r>
             <a:r>
               <a:rPr lang="fr-FR" sz="1400" b="1" i="0" spc="0" dirty="0">

</xml_diff>